<commit_message>
Cleaned up fig folders and code
</commit_message>
<xml_diff>
--- a/Figures/sites.pptx
+++ b/Figures/sites.pptx
@@ -104,6 +104,11 @@
       </a:defRPr>
     </a:lvl9pPr>
   </p:defaultTextStyle>
+  <p:extLst>
+    <p:ext uri="{EFAFB233-063F-42B5-8137-9DF3F51BA10A}">
+      <p15:sldGuideLst xmlns:p15="http://schemas.microsoft.com/office/powerpoint/2012/main"/>
+    </p:ext>
+  </p:extLst>
 </p:presentation>
 </file>
 
@@ -254,7 +259,7 @@
           <a:p>
             <a:fld id="{643BE96A-601A-2A49-A332-F611E4C58A85}" type="datetimeFigureOut">
               <a:rPr lang="en-US" smtClean="0"/>
-              <a:t>1/26/22</a:t>
+              <a:t>8/4/2023</a:t>
             </a:fld>
             <a:endParaRPr lang="en-US"/>
           </a:p>
@@ -452,7 +457,7 @@
           <a:p>
             <a:fld id="{643BE96A-601A-2A49-A332-F611E4C58A85}" type="datetimeFigureOut">
               <a:rPr lang="en-US" smtClean="0"/>
-              <a:t>1/26/22</a:t>
+              <a:t>8/4/2023</a:t>
             </a:fld>
             <a:endParaRPr lang="en-US"/>
           </a:p>
@@ -660,7 +665,7 @@
           <a:p>
             <a:fld id="{643BE96A-601A-2A49-A332-F611E4C58A85}" type="datetimeFigureOut">
               <a:rPr lang="en-US" smtClean="0"/>
-              <a:t>1/26/22</a:t>
+              <a:t>8/4/2023</a:t>
             </a:fld>
             <a:endParaRPr lang="en-US"/>
           </a:p>
@@ -858,7 +863,7 @@
           <a:p>
             <a:fld id="{643BE96A-601A-2A49-A332-F611E4C58A85}" type="datetimeFigureOut">
               <a:rPr lang="en-US" smtClean="0"/>
-              <a:t>1/26/22</a:t>
+              <a:t>8/4/2023</a:t>
             </a:fld>
             <a:endParaRPr lang="en-US"/>
           </a:p>
@@ -1133,7 +1138,7 @@
           <a:p>
             <a:fld id="{643BE96A-601A-2A49-A332-F611E4C58A85}" type="datetimeFigureOut">
               <a:rPr lang="en-US" smtClean="0"/>
-              <a:t>1/26/22</a:t>
+              <a:t>8/4/2023</a:t>
             </a:fld>
             <a:endParaRPr lang="en-US"/>
           </a:p>
@@ -1398,7 +1403,7 @@
           <a:p>
             <a:fld id="{643BE96A-601A-2A49-A332-F611E4C58A85}" type="datetimeFigureOut">
               <a:rPr lang="en-US" smtClean="0"/>
-              <a:t>1/26/22</a:t>
+              <a:t>8/4/2023</a:t>
             </a:fld>
             <a:endParaRPr lang="en-US"/>
           </a:p>
@@ -1810,7 +1815,7 @@
           <a:p>
             <a:fld id="{643BE96A-601A-2A49-A332-F611E4C58A85}" type="datetimeFigureOut">
               <a:rPr lang="en-US" smtClean="0"/>
-              <a:t>1/26/22</a:t>
+              <a:t>8/4/2023</a:t>
             </a:fld>
             <a:endParaRPr lang="en-US"/>
           </a:p>
@@ -1951,7 +1956,7 @@
           <a:p>
             <a:fld id="{643BE96A-601A-2A49-A332-F611E4C58A85}" type="datetimeFigureOut">
               <a:rPr lang="en-US" smtClean="0"/>
-              <a:t>1/26/22</a:t>
+              <a:t>8/4/2023</a:t>
             </a:fld>
             <a:endParaRPr lang="en-US"/>
           </a:p>
@@ -2064,7 +2069,7 @@
           <a:p>
             <a:fld id="{643BE96A-601A-2A49-A332-F611E4C58A85}" type="datetimeFigureOut">
               <a:rPr lang="en-US" smtClean="0"/>
-              <a:t>1/26/22</a:t>
+              <a:t>8/4/2023</a:t>
             </a:fld>
             <a:endParaRPr lang="en-US"/>
           </a:p>
@@ -2375,7 +2380,7 @@
           <a:p>
             <a:fld id="{643BE96A-601A-2A49-A332-F611E4C58A85}" type="datetimeFigureOut">
               <a:rPr lang="en-US" smtClean="0"/>
-              <a:t>1/26/22</a:t>
+              <a:t>8/4/2023</a:t>
             </a:fld>
             <a:endParaRPr lang="en-US"/>
           </a:p>
@@ -2663,7 +2668,7 @@
           <a:p>
             <a:fld id="{643BE96A-601A-2A49-A332-F611E4C58A85}" type="datetimeFigureOut">
               <a:rPr lang="en-US" smtClean="0"/>
-              <a:t>1/26/22</a:t>
+              <a:t>8/4/2023</a:t>
             </a:fld>
             <a:endParaRPr lang="en-US"/>
           </a:p>
@@ -2904,7 +2909,7 @@
           <a:p>
             <a:fld id="{643BE96A-601A-2A49-A332-F611E4C58A85}" type="datetimeFigureOut">
               <a:rPr lang="en-US" smtClean="0"/>
-              <a:t>1/26/22</a:t>
+              <a:t>8/4/2023</a:t>
             </a:fld>
             <a:endParaRPr lang="en-US"/>
           </a:p>
@@ -3735,7 +3740,7 @@
         </p:nvSpPr>
         <p:spPr>
           <a:xfrm>
-            <a:off x="8057803" y="120238"/>
+            <a:off x="8057803" y="102985"/>
             <a:ext cx="2502568" cy="712910"/>
           </a:xfrm>
           <a:prstGeom prst="rect">
@@ -3935,7 +3940,7 @@
         </p:nvGrpSpPr>
         <p:grpSpPr>
           <a:xfrm>
-            <a:off x="720874" y="1263363"/>
+            <a:off x="724668" y="1837240"/>
             <a:ext cx="1245571" cy="1001030"/>
             <a:chOff x="514170" y="338768"/>
             <a:chExt cx="1245571" cy="1001030"/>
@@ -4256,7 +4261,7 @@
         </p:nvGrpSpPr>
         <p:grpSpPr>
           <a:xfrm>
-            <a:off x="3307130" y="1027727"/>
+            <a:off x="3307130" y="1480147"/>
             <a:ext cx="6486705" cy="1624287"/>
             <a:chOff x="2291130" y="2233517"/>
             <a:chExt cx="6486705" cy="1624287"/>
@@ -4720,7 +4725,7 @@
         </p:nvSpPr>
         <p:spPr>
           <a:xfrm>
-            <a:off x="2812814" y="3104618"/>
+            <a:off x="2812814" y="3557038"/>
             <a:ext cx="2502568" cy="712910"/>
           </a:xfrm>
           <a:prstGeom prst="rect">
@@ -4924,7 +4929,7 @@
         </p:nvSpPr>
         <p:spPr>
           <a:xfrm>
-            <a:off x="5513437" y="3104618"/>
+            <a:off x="5513437" y="3557038"/>
             <a:ext cx="2502568" cy="712910"/>
           </a:xfrm>
           <a:prstGeom prst="rect">
@@ -5128,7 +5133,7 @@
         </p:nvSpPr>
         <p:spPr>
           <a:xfrm>
-            <a:off x="8170960" y="3062238"/>
+            <a:off x="8187358" y="3557038"/>
             <a:ext cx="2502568" cy="712910"/>
           </a:xfrm>
           <a:prstGeom prst="rect">
@@ -5331,7 +5336,7 @@
         </p:nvSpPr>
         <p:spPr>
           <a:xfrm>
-            <a:off x="83933" y="3104618"/>
+            <a:off x="83933" y="3557038"/>
             <a:ext cx="2502568" cy="712910"/>
           </a:xfrm>
           <a:prstGeom prst="rect">
@@ -5573,7 +5578,7 @@
         </p:nvSpPr>
         <p:spPr>
           <a:xfrm>
-            <a:off x="83933" y="161290"/>
+            <a:off x="83933" y="476693"/>
             <a:ext cx="2502568" cy="712910"/>
           </a:xfrm>
           <a:prstGeom prst="rect">
@@ -5772,7 +5777,7 @@
         </p:nvCxnSpPr>
         <p:spPr>
           <a:xfrm>
-            <a:off x="83933" y="833148"/>
+            <a:off x="83933" y="1285568"/>
             <a:ext cx="11376869" cy="0"/>
           </a:xfrm>
           <a:prstGeom prst="line">
@@ -5815,7 +5820,7 @@
         </p:nvCxnSpPr>
         <p:spPr>
           <a:xfrm>
-            <a:off x="83933" y="2849182"/>
+            <a:off x="218678" y="3289130"/>
             <a:ext cx="11376869" cy="0"/>
           </a:xfrm>
           <a:prstGeom prst="line">
@@ -5842,6 +5847,603 @@
           </a:fontRef>
         </p:style>
       </p:cxnSp>
+      <p:sp>
+        <p:nvSpPr>
+          <p:cNvPr id="2" name="Subtitle 2">
+            <a:extLst>
+              <a:ext uri="{FF2B5EF4-FFF2-40B4-BE49-F238E27FC236}">
+                <a16:creationId xmlns:a16="http://schemas.microsoft.com/office/drawing/2014/main" id="{BAF40848-B8F9-CED9-4C50-21EF31F431F9}"/>
+              </a:ext>
+            </a:extLst>
+          </p:cNvPr>
+          <p:cNvSpPr txBox="1">
+            <a:spLocks/>
+          </p:cNvSpPr>
+          <p:nvPr/>
+        </p:nvSpPr>
+        <p:spPr>
+          <a:xfrm>
+            <a:off x="2882913" y="615671"/>
+            <a:ext cx="2502568" cy="712910"/>
+          </a:xfrm>
+          <a:prstGeom prst="rect">
+            <a:avLst/>
+          </a:prstGeom>
+        </p:spPr>
+        <p:txBody>
+          <a:bodyPr vert="horz" lIns="91440" tIns="45720" rIns="91440" bIns="45720" rtlCol="0">
+            <a:normAutofit/>
+          </a:bodyPr>
+          <a:lstStyle>
+            <a:lvl1pPr marL="0" indent="0" algn="ctr" defTabSz="914400" rtl="0" eaLnBrk="1" latinLnBrk="0" hangingPunct="1">
+              <a:lnSpc>
+                <a:spcPct val="90000"/>
+              </a:lnSpc>
+              <a:spcBef>
+                <a:spcPts val="1000"/>
+              </a:spcBef>
+              <a:buFont typeface="Arial" panose="020B0604020202020204" pitchFamily="34" charset="0"/>
+              <a:buNone/>
+              <a:defRPr sz="2400" kern="1200">
+                <a:solidFill>
+                  <a:schemeClr val="tx1"/>
+                </a:solidFill>
+                <a:latin typeface="+mn-lt"/>
+                <a:ea typeface="+mn-ea"/>
+                <a:cs typeface="+mn-cs"/>
+              </a:defRPr>
+            </a:lvl1pPr>
+            <a:lvl2pPr marL="457200" indent="0" algn="ctr" defTabSz="914400" rtl="0" eaLnBrk="1" latinLnBrk="0" hangingPunct="1">
+              <a:lnSpc>
+                <a:spcPct val="90000"/>
+              </a:lnSpc>
+              <a:spcBef>
+                <a:spcPts val="500"/>
+              </a:spcBef>
+              <a:buFont typeface="Arial" panose="020B0604020202020204" pitchFamily="34" charset="0"/>
+              <a:buNone/>
+              <a:defRPr sz="2000" kern="1200">
+                <a:solidFill>
+                  <a:schemeClr val="tx1"/>
+                </a:solidFill>
+                <a:latin typeface="+mn-lt"/>
+                <a:ea typeface="+mn-ea"/>
+                <a:cs typeface="+mn-cs"/>
+              </a:defRPr>
+            </a:lvl2pPr>
+            <a:lvl3pPr marL="914400" indent="0" algn="ctr" defTabSz="914400" rtl="0" eaLnBrk="1" latinLnBrk="0" hangingPunct="1">
+              <a:lnSpc>
+                <a:spcPct val="90000"/>
+              </a:lnSpc>
+              <a:spcBef>
+                <a:spcPts val="500"/>
+              </a:spcBef>
+              <a:buFont typeface="Arial" panose="020B0604020202020204" pitchFamily="34" charset="0"/>
+              <a:buNone/>
+              <a:defRPr sz="1800" kern="1200">
+                <a:solidFill>
+                  <a:schemeClr val="tx1"/>
+                </a:solidFill>
+                <a:latin typeface="+mn-lt"/>
+                <a:ea typeface="+mn-ea"/>
+                <a:cs typeface="+mn-cs"/>
+              </a:defRPr>
+            </a:lvl3pPr>
+            <a:lvl4pPr marL="1371600" indent="0" algn="ctr" defTabSz="914400" rtl="0" eaLnBrk="1" latinLnBrk="0" hangingPunct="1">
+              <a:lnSpc>
+                <a:spcPct val="90000"/>
+              </a:lnSpc>
+              <a:spcBef>
+                <a:spcPts val="500"/>
+              </a:spcBef>
+              <a:buFont typeface="Arial" panose="020B0604020202020204" pitchFamily="34" charset="0"/>
+              <a:buNone/>
+              <a:defRPr sz="1600" kern="1200">
+                <a:solidFill>
+                  <a:schemeClr val="tx1"/>
+                </a:solidFill>
+                <a:latin typeface="+mn-lt"/>
+                <a:ea typeface="+mn-ea"/>
+                <a:cs typeface="+mn-cs"/>
+              </a:defRPr>
+            </a:lvl4pPr>
+            <a:lvl5pPr marL="1828800" indent="0" algn="ctr" defTabSz="914400" rtl="0" eaLnBrk="1" latinLnBrk="0" hangingPunct="1">
+              <a:lnSpc>
+                <a:spcPct val="90000"/>
+              </a:lnSpc>
+              <a:spcBef>
+                <a:spcPts val="500"/>
+              </a:spcBef>
+              <a:buFont typeface="Arial" panose="020B0604020202020204" pitchFamily="34" charset="0"/>
+              <a:buNone/>
+              <a:defRPr sz="1600" kern="1200">
+                <a:solidFill>
+                  <a:schemeClr val="tx1"/>
+                </a:solidFill>
+                <a:latin typeface="+mn-lt"/>
+                <a:ea typeface="+mn-ea"/>
+                <a:cs typeface="+mn-cs"/>
+              </a:defRPr>
+            </a:lvl5pPr>
+            <a:lvl6pPr marL="2286000" indent="0" algn="ctr" defTabSz="914400" rtl="0" eaLnBrk="1" latinLnBrk="0" hangingPunct="1">
+              <a:lnSpc>
+                <a:spcPct val="90000"/>
+              </a:lnSpc>
+              <a:spcBef>
+                <a:spcPts val="500"/>
+              </a:spcBef>
+              <a:buFont typeface="Arial" panose="020B0604020202020204" pitchFamily="34" charset="0"/>
+              <a:buNone/>
+              <a:defRPr sz="1600" kern="1200">
+                <a:solidFill>
+                  <a:schemeClr val="tx1"/>
+                </a:solidFill>
+                <a:latin typeface="+mn-lt"/>
+                <a:ea typeface="+mn-ea"/>
+                <a:cs typeface="+mn-cs"/>
+              </a:defRPr>
+            </a:lvl6pPr>
+            <a:lvl7pPr marL="2743200" indent="0" algn="ctr" defTabSz="914400" rtl="0" eaLnBrk="1" latinLnBrk="0" hangingPunct="1">
+              <a:lnSpc>
+                <a:spcPct val="90000"/>
+              </a:lnSpc>
+              <a:spcBef>
+                <a:spcPts val="500"/>
+              </a:spcBef>
+              <a:buFont typeface="Arial" panose="020B0604020202020204" pitchFamily="34" charset="0"/>
+              <a:buNone/>
+              <a:defRPr sz="1600" kern="1200">
+                <a:solidFill>
+                  <a:schemeClr val="tx1"/>
+                </a:solidFill>
+                <a:latin typeface="+mn-lt"/>
+                <a:ea typeface="+mn-ea"/>
+                <a:cs typeface="+mn-cs"/>
+              </a:defRPr>
+            </a:lvl7pPr>
+            <a:lvl8pPr marL="3200400" indent="0" algn="ctr" defTabSz="914400" rtl="0" eaLnBrk="1" latinLnBrk="0" hangingPunct="1">
+              <a:lnSpc>
+                <a:spcPct val="90000"/>
+              </a:lnSpc>
+              <a:spcBef>
+                <a:spcPts val="500"/>
+              </a:spcBef>
+              <a:buFont typeface="Arial" panose="020B0604020202020204" pitchFamily="34" charset="0"/>
+              <a:buNone/>
+              <a:defRPr sz="1600" kern="1200">
+                <a:solidFill>
+                  <a:schemeClr val="tx1"/>
+                </a:solidFill>
+                <a:latin typeface="+mn-lt"/>
+                <a:ea typeface="+mn-ea"/>
+                <a:cs typeface="+mn-cs"/>
+              </a:defRPr>
+            </a:lvl8pPr>
+            <a:lvl9pPr marL="3657600" indent="0" algn="ctr" defTabSz="914400" rtl="0" eaLnBrk="1" latinLnBrk="0" hangingPunct="1">
+              <a:lnSpc>
+                <a:spcPct val="90000"/>
+              </a:lnSpc>
+              <a:spcBef>
+                <a:spcPts val="500"/>
+              </a:spcBef>
+              <a:buFont typeface="Arial" panose="020B0604020202020204" pitchFamily="34" charset="0"/>
+              <a:buNone/>
+              <a:defRPr sz="1600" kern="1200">
+                <a:solidFill>
+                  <a:schemeClr val="tx1"/>
+                </a:solidFill>
+                <a:latin typeface="+mn-lt"/>
+                <a:ea typeface="+mn-ea"/>
+                <a:cs typeface="+mn-cs"/>
+              </a:defRPr>
+            </a:lvl9pPr>
+          </a:lstStyle>
+          <a:p>
+            <a:r>
+              <a:rPr lang="en-US" sz="3200" dirty="0"/>
+              <a:t>hollow</a:t>
+            </a:r>
+          </a:p>
+        </p:txBody>
+      </p:sp>
+      <p:sp>
+        <p:nvSpPr>
+          <p:cNvPr id="3" name="Subtitle 2">
+            <a:extLst>
+              <a:ext uri="{FF2B5EF4-FFF2-40B4-BE49-F238E27FC236}">
+                <a16:creationId xmlns:a16="http://schemas.microsoft.com/office/drawing/2014/main" id="{BFAA2D73-B894-226B-51DE-064020FD3AEA}"/>
+              </a:ext>
+            </a:extLst>
+          </p:cNvPr>
+          <p:cNvSpPr txBox="1">
+            <a:spLocks/>
+          </p:cNvSpPr>
+          <p:nvPr/>
+        </p:nvSpPr>
+        <p:spPr>
+          <a:xfrm>
+            <a:off x="5555235" y="615671"/>
+            <a:ext cx="2502568" cy="712910"/>
+          </a:xfrm>
+          <a:prstGeom prst="rect">
+            <a:avLst/>
+          </a:prstGeom>
+        </p:spPr>
+        <p:txBody>
+          <a:bodyPr vert="horz" lIns="91440" tIns="45720" rIns="91440" bIns="45720" rtlCol="0">
+            <a:normAutofit/>
+          </a:bodyPr>
+          <a:lstStyle>
+            <a:lvl1pPr marL="0" indent="0" algn="ctr" defTabSz="914400" rtl="0" eaLnBrk="1" latinLnBrk="0" hangingPunct="1">
+              <a:lnSpc>
+                <a:spcPct val="90000"/>
+              </a:lnSpc>
+              <a:spcBef>
+                <a:spcPts val="1000"/>
+              </a:spcBef>
+              <a:buFont typeface="Arial" panose="020B0604020202020204" pitchFamily="34" charset="0"/>
+              <a:buNone/>
+              <a:defRPr sz="2400" kern="1200">
+                <a:solidFill>
+                  <a:schemeClr val="tx1"/>
+                </a:solidFill>
+                <a:latin typeface="+mn-lt"/>
+                <a:ea typeface="+mn-ea"/>
+                <a:cs typeface="+mn-cs"/>
+              </a:defRPr>
+            </a:lvl1pPr>
+            <a:lvl2pPr marL="457200" indent="0" algn="ctr" defTabSz="914400" rtl="0" eaLnBrk="1" latinLnBrk="0" hangingPunct="1">
+              <a:lnSpc>
+                <a:spcPct val="90000"/>
+              </a:lnSpc>
+              <a:spcBef>
+                <a:spcPts val="500"/>
+              </a:spcBef>
+              <a:buFont typeface="Arial" panose="020B0604020202020204" pitchFamily="34" charset="0"/>
+              <a:buNone/>
+              <a:defRPr sz="2000" kern="1200">
+                <a:solidFill>
+                  <a:schemeClr val="tx1"/>
+                </a:solidFill>
+                <a:latin typeface="+mn-lt"/>
+                <a:ea typeface="+mn-ea"/>
+                <a:cs typeface="+mn-cs"/>
+              </a:defRPr>
+            </a:lvl2pPr>
+            <a:lvl3pPr marL="914400" indent="0" algn="ctr" defTabSz="914400" rtl="0" eaLnBrk="1" latinLnBrk="0" hangingPunct="1">
+              <a:lnSpc>
+                <a:spcPct val="90000"/>
+              </a:lnSpc>
+              <a:spcBef>
+                <a:spcPts val="500"/>
+              </a:spcBef>
+              <a:buFont typeface="Arial" panose="020B0604020202020204" pitchFamily="34" charset="0"/>
+              <a:buNone/>
+              <a:defRPr sz="1800" kern="1200">
+                <a:solidFill>
+                  <a:schemeClr val="tx1"/>
+                </a:solidFill>
+                <a:latin typeface="+mn-lt"/>
+                <a:ea typeface="+mn-ea"/>
+                <a:cs typeface="+mn-cs"/>
+              </a:defRPr>
+            </a:lvl3pPr>
+            <a:lvl4pPr marL="1371600" indent="0" algn="ctr" defTabSz="914400" rtl="0" eaLnBrk="1" latinLnBrk="0" hangingPunct="1">
+              <a:lnSpc>
+                <a:spcPct val="90000"/>
+              </a:lnSpc>
+              <a:spcBef>
+                <a:spcPts val="500"/>
+              </a:spcBef>
+              <a:buFont typeface="Arial" panose="020B0604020202020204" pitchFamily="34" charset="0"/>
+              <a:buNone/>
+              <a:defRPr sz="1600" kern="1200">
+                <a:solidFill>
+                  <a:schemeClr val="tx1"/>
+                </a:solidFill>
+                <a:latin typeface="+mn-lt"/>
+                <a:ea typeface="+mn-ea"/>
+                <a:cs typeface="+mn-cs"/>
+              </a:defRPr>
+            </a:lvl4pPr>
+            <a:lvl5pPr marL="1828800" indent="0" algn="ctr" defTabSz="914400" rtl="0" eaLnBrk="1" latinLnBrk="0" hangingPunct="1">
+              <a:lnSpc>
+                <a:spcPct val="90000"/>
+              </a:lnSpc>
+              <a:spcBef>
+                <a:spcPts val="500"/>
+              </a:spcBef>
+              <a:buFont typeface="Arial" panose="020B0604020202020204" pitchFamily="34" charset="0"/>
+              <a:buNone/>
+              <a:defRPr sz="1600" kern="1200">
+                <a:solidFill>
+                  <a:schemeClr val="tx1"/>
+                </a:solidFill>
+                <a:latin typeface="+mn-lt"/>
+                <a:ea typeface="+mn-ea"/>
+                <a:cs typeface="+mn-cs"/>
+              </a:defRPr>
+            </a:lvl5pPr>
+            <a:lvl6pPr marL="2286000" indent="0" algn="ctr" defTabSz="914400" rtl="0" eaLnBrk="1" latinLnBrk="0" hangingPunct="1">
+              <a:lnSpc>
+                <a:spcPct val="90000"/>
+              </a:lnSpc>
+              <a:spcBef>
+                <a:spcPts val="500"/>
+              </a:spcBef>
+              <a:buFont typeface="Arial" panose="020B0604020202020204" pitchFamily="34" charset="0"/>
+              <a:buNone/>
+              <a:defRPr sz="1600" kern="1200">
+                <a:solidFill>
+                  <a:schemeClr val="tx1"/>
+                </a:solidFill>
+                <a:latin typeface="+mn-lt"/>
+                <a:ea typeface="+mn-ea"/>
+                <a:cs typeface="+mn-cs"/>
+              </a:defRPr>
+            </a:lvl6pPr>
+            <a:lvl7pPr marL="2743200" indent="0" algn="ctr" defTabSz="914400" rtl="0" eaLnBrk="1" latinLnBrk="0" hangingPunct="1">
+              <a:lnSpc>
+                <a:spcPct val="90000"/>
+              </a:lnSpc>
+              <a:spcBef>
+                <a:spcPts val="500"/>
+              </a:spcBef>
+              <a:buFont typeface="Arial" panose="020B0604020202020204" pitchFamily="34" charset="0"/>
+              <a:buNone/>
+              <a:defRPr sz="1600" kern="1200">
+                <a:solidFill>
+                  <a:schemeClr val="tx1"/>
+                </a:solidFill>
+                <a:latin typeface="+mn-lt"/>
+                <a:ea typeface="+mn-ea"/>
+                <a:cs typeface="+mn-cs"/>
+              </a:defRPr>
+            </a:lvl7pPr>
+            <a:lvl8pPr marL="3200400" indent="0" algn="ctr" defTabSz="914400" rtl="0" eaLnBrk="1" latinLnBrk="0" hangingPunct="1">
+              <a:lnSpc>
+                <a:spcPct val="90000"/>
+              </a:lnSpc>
+              <a:spcBef>
+                <a:spcPts val="500"/>
+              </a:spcBef>
+              <a:buFont typeface="Arial" panose="020B0604020202020204" pitchFamily="34" charset="0"/>
+              <a:buNone/>
+              <a:defRPr sz="1600" kern="1200">
+                <a:solidFill>
+                  <a:schemeClr val="tx1"/>
+                </a:solidFill>
+                <a:latin typeface="+mn-lt"/>
+                <a:ea typeface="+mn-ea"/>
+                <a:cs typeface="+mn-cs"/>
+              </a:defRPr>
+            </a:lvl8pPr>
+            <a:lvl9pPr marL="3657600" indent="0" algn="ctr" defTabSz="914400" rtl="0" eaLnBrk="1" latinLnBrk="0" hangingPunct="1">
+              <a:lnSpc>
+                <a:spcPct val="90000"/>
+              </a:lnSpc>
+              <a:spcBef>
+                <a:spcPts val="500"/>
+              </a:spcBef>
+              <a:buFont typeface="Arial" panose="020B0604020202020204" pitchFamily="34" charset="0"/>
+              <a:buNone/>
+              <a:defRPr sz="1600" kern="1200">
+                <a:solidFill>
+                  <a:schemeClr val="tx1"/>
+                </a:solidFill>
+                <a:latin typeface="+mn-lt"/>
+                <a:ea typeface="+mn-ea"/>
+                <a:cs typeface="+mn-cs"/>
+              </a:defRPr>
+            </a:lvl9pPr>
+          </a:lstStyle>
+          <a:p>
+            <a:r>
+              <a:rPr lang="en-US" sz="3200" dirty="0"/>
+              <a:t>bridge</a:t>
+            </a:r>
+          </a:p>
+        </p:txBody>
+      </p:sp>
+      <p:sp>
+        <p:nvSpPr>
+          <p:cNvPr id="4" name="Subtitle 2">
+            <a:extLst>
+              <a:ext uri="{FF2B5EF4-FFF2-40B4-BE49-F238E27FC236}">
+                <a16:creationId xmlns:a16="http://schemas.microsoft.com/office/drawing/2014/main" id="{BA92B598-6BF4-AD24-32BB-64043CCE6EF0}"/>
+              </a:ext>
+            </a:extLst>
+          </p:cNvPr>
+          <p:cNvSpPr txBox="1">
+            <a:spLocks/>
+          </p:cNvSpPr>
+          <p:nvPr/>
+        </p:nvSpPr>
+        <p:spPr>
+          <a:xfrm>
+            <a:off x="8134310" y="572658"/>
+            <a:ext cx="2502568" cy="712910"/>
+          </a:xfrm>
+          <a:prstGeom prst="rect">
+            <a:avLst/>
+          </a:prstGeom>
+        </p:spPr>
+        <p:txBody>
+          <a:bodyPr vert="horz" lIns="91440" tIns="45720" rIns="91440" bIns="45720" rtlCol="0">
+            <a:normAutofit/>
+          </a:bodyPr>
+          <a:lstStyle>
+            <a:lvl1pPr marL="0" indent="0" algn="ctr" defTabSz="914400" rtl="0" eaLnBrk="1" latinLnBrk="0" hangingPunct="1">
+              <a:lnSpc>
+                <a:spcPct val="90000"/>
+              </a:lnSpc>
+              <a:spcBef>
+                <a:spcPts val="1000"/>
+              </a:spcBef>
+              <a:buFont typeface="Arial" panose="020B0604020202020204" pitchFamily="34" charset="0"/>
+              <a:buNone/>
+              <a:defRPr sz="2400" kern="1200">
+                <a:solidFill>
+                  <a:schemeClr val="tx1"/>
+                </a:solidFill>
+                <a:latin typeface="+mn-lt"/>
+                <a:ea typeface="+mn-ea"/>
+                <a:cs typeface="+mn-cs"/>
+              </a:defRPr>
+            </a:lvl1pPr>
+            <a:lvl2pPr marL="457200" indent="0" algn="ctr" defTabSz="914400" rtl="0" eaLnBrk="1" latinLnBrk="0" hangingPunct="1">
+              <a:lnSpc>
+                <a:spcPct val="90000"/>
+              </a:lnSpc>
+              <a:spcBef>
+                <a:spcPts val="500"/>
+              </a:spcBef>
+              <a:buFont typeface="Arial" panose="020B0604020202020204" pitchFamily="34" charset="0"/>
+              <a:buNone/>
+              <a:defRPr sz="2000" kern="1200">
+                <a:solidFill>
+                  <a:schemeClr val="tx1"/>
+                </a:solidFill>
+                <a:latin typeface="+mn-lt"/>
+                <a:ea typeface="+mn-ea"/>
+                <a:cs typeface="+mn-cs"/>
+              </a:defRPr>
+            </a:lvl2pPr>
+            <a:lvl3pPr marL="914400" indent="0" algn="ctr" defTabSz="914400" rtl="0" eaLnBrk="1" latinLnBrk="0" hangingPunct="1">
+              <a:lnSpc>
+                <a:spcPct val="90000"/>
+              </a:lnSpc>
+              <a:spcBef>
+                <a:spcPts val="500"/>
+              </a:spcBef>
+              <a:buFont typeface="Arial" panose="020B0604020202020204" pitchFamily="34" charset="0"/>
+              <a:buNone/>
+              <a:defRPr sz="1800" kern="1200">
+                <a:solidFill>
+                  <a:schemeClr val="tx1"/>
+                </a:solidFill>
+                <a:latin typeface="+mn-lt"/>
+                <a:ea typeface="+mn-ea"/>
+                <a:cs typeface="+mn-cs"/>
+              </a:defRPr>
+            </a:lvl3pPr>
+            <a:lvl4pPr marL="1371600" indent="0" algn="ctr" defTabSz="914400" rtl="0" eaLnBrk="1" latinLnBrk="0" hangingPunct="1">
+              <a:lnSpc>
+                <a:spcPct val="90000"/>
+              </a:lnSpc>
+              <a:spcBef>
+                <a:spcPts val="500"/>
+              </a:spcBef>
+              <a:buFont typeface="Arial" panose="020B0604020202020204" pitchFamily="34" charset="0"/>
+              <a:buNone/>
+              <a:defRPr sz="1600" kern="1200">
+                <a:solidFill>
+                  <a:schemeClr val="tx1"/>
+                </a:solidFill>
+                <a:latin typeface="+mn-lt"/>
+                <a:ea typeface="+mn-ea"/>
+                <a:cs typeface="+mn-cs"/>
+              </a:defRPr>
+            </a:lvl4pPr>
+            <a:lvl5pPr marL="1828800" indent="0" algn="ctr" defTabSz="914400" rtl="0" eaLnBrk="1" latinLnBrk="0" hangingPunct="1">
+              <a:lnSpc>
+                <a:spcPct val="90000"/>
+              </a:lnSpc>
+              <a:spcBef>
+                <a:spcPts val="500"/>
+              </a:spcBef>
+              <a:buFont typeface="Arial" panose="020B0604020202020204" pitchFamily="34" charset="0"/>
+              <a:buNone/>
+              <a:defRPr sz="1600" kern="1200">
+                <a:solidFill>
+                  <a:schemeClr val="tx1"/>
+                </a:solidFill>
+                <a:latin typeface="+mn-lt"/>
+                <a:ea typeface="+mn-ea"/>
+                <a:cs typeface="+mn-cs"/>
+              </a:defRPr>
+            </a:lvl5pPr>
+            <a:lvl6pPr marL="2286000" indent="0" algn="ctr" defTabSz="914400" rtl="0" eaLnBrk="1" latinLnBrk="0" hangingPunct="1">
+              <a:lnSpc>
+                <a:spcPct val="90000"/>
+              </a:lnSpc>
+              <a:spcBef>
+                <a:spcPts val="500"/>
+              </a:spcBef>
+              <a:buFont typeface="Arial" panose="020B0604020202020204" pitchFamily="34" charset="0"/>
+              <a:buNone/>
+              <a:defRPr sz="1600" kern="1200">
+                <a:solidFill>
+                  <a:schemeClr val="tx1"/>
+                </a:solidFill>
+                <a:latin typeface="+mn-lt"/>
+                <a:ea typeface="+mn-ea"/>
+                <a:cs typeface="+mn-cs"/>
+              </a:defRPr>
+            </a:lvl6pPr>
+            <a:lvl7pPr marL="2743200" indent="0" algn="ctr" defTabSz="914400" rtl="0" eaLnBrk="1" latinLnBrk="0" hangingPunct="1">
+              <a:lnSpc>
+                <a:spcPct val="90000"/>
+              </a:lnSpc>
+              <a:spcBef>
+                <a:spcPts val="500"/>
+              </a:spcBef>
+              <a:buFont typeface="Arial" panose="020B0604020202020204" pitchFamily="34" charset="0"/>
+              <a:buNone/>
+              <a:defRPr sz="1600" kern="1200">
+                <a:solidFill>
+                  <a:schemeClr val="tx1"/>
+                </a:solidFill>
+                <a:latin typeface="+mn-lt"/>
+                <a:ea typeface="+mn-ea"/>
+                <a:cs typeface="+mn-cs"/>
+              </a:defRPr>
+            </a:lvl7pPr>
+            <a:lvl8pPr marL="3200400" indent="0" algn="ctr" defTabSz="914400" rtl="0" eaLnBrk="1" latinLnBrk="0" hangingPunct="1">
+              <a:lnSpc>
+                <a:spcPct val="90000"/>
+              </a:lnSpc>
+              <a:spcBef>
+                <a:spcPts val="500"/>
+              </a:spcBef>
+              <a:buFont typeface="Arial" panose="020B0604020202020204" pitchFamily="34" charset="0"/>
+              <a:buNone/>
+              <a:defRPr sz="1600" kern="1200">
+                <a:solidFill>
+                  <a:schemeClr val="tx1"/>
+                </a:solidFill>
+                <a:latin typeface="+mn-lt"/>
+                <a:ea typeface="+mn-ea"/>
+                <a:cs typeface="+mn-cs"/>
+              </a:defRPr>
+            </a:lvl8pPr>
+            <a:lvl9pPr marL="3657600" indent="0" algn="ctr" defTabSz="914400" rtl="0" eaLnBrk="1" latinLnBrk="0" hangingPunct="1">
+              <a:lnSpc>
+                <a:spcPct val="90000"/>
+              </a:lnSpc>
+              <a:spcBef>
+                <a:spcPts val="500"/>
+              </a:spcBef>
+              <a:buFont typeface="Arial" panose="020B0604020202020204" pitchFamily="34" charset="0"/>
+              <a:buNone/>
+              <a:defRPr sz="1600" kern="1200">
+                <a:solidFill>
+                  <a:schemeClr val="tx1"/>
+                </a:solidFill>
+                <a:latin typeface="+mn-lt"/>
+                <a:ea typeface="+mn-ea"/>
+                <a:cs typeface="+mn-cs"/>
+              </a:defRPr>
+            </a:lvl9pPr>
+          </a:lstStyle>
+          <a:p>
+            <a:r>
+              <a:rPr lang="en-US" sz="3200" dirty="0"/>
+              <a:t>atop</a:t>
+            </a:r>
+          </a:p>
+        </p:txBody>
+      </p:sp>
     </p:spTree>
     <p:extLst>
       <p:ext uri="{BB962C8B-B14F-4D97-AF65-F5344CB8AC3E}">
@@ -6166,6 +6768,141 @@
                       </p:childTnLst>
                     </p:cTn>
                   </p:par>
+                  <p:par>
+                    <p:cTn id="29" fill="hold">
+                      <p:stCondLst>
+                        <p:cond delay="indefinite"/>
+                      </p:stCondLst>
+                      <p:childTnLst>
+                        <p:par>
+                          <p:cTn id="30" fill="hold">
+                            <p:stCondLst>
+                              <p:cond delay="0"/>
+                            </p:stCondLst>
+                            <p:childTnLst>
+                              <p:par>
+                                <p:cTn id="31" presetID="1" presetClass="entr" presetSubtype="0" fill="hold" grpId="0" nodeType="clickEffect">
+                                  <p:stCondLst>
+                                    <p:cond delay="0"/>
+                                  </p:stCondLst>
+                                  <p:childTnLst>
+                                    <p:set>
+                                      <p:cBhvr>
+                                        <p:cTn id="32" dur="1" fill="hold">
+                                          <p:stCondLst>
+                                            <p:cond delay="0"/>
+                                          </p:stCondLst>
+                                        </p:cTn>
+                                        <p:tgtEl>
+                                          <p:spTgt spid="2"/>
+                                        </p:tgtEl>
+                                        <p:attrNameLst>
+                                          <p:attrName>style.visibility</p:attrName>
+                                        </p:attrNameLst>
+                                      </p:cBhvr>
+                                      <p:to>
+                                        <p:strVal val="visible"/>
+                                      </p:to>
+                                    </p:set>
+                                  </p:childTnLst>
+                                </p:cTn>
+                              </p:par>
+                            </p:childTnLst>
+                          </p:cTn>
+                        </p:par>
+                      </p:childTnLst>
+                    </p:cTn>
+                  </p:par>
+                  <p:par>
+                    <p:cTn id="33" fill="hold">
+                      <p:stCondLst>
+                        <p:cond delay="indefinite"/>
+                      </p:stCondLst>
+                      <p:childTnLst>
+                        <p:par>
+                          <p:cTn id="34" fill="hold">
+                            <p:stCondLst>
+                              <p:cond delay="0"/>
+                            </p:stCondLst>
+                            <p:childTnLst>
+                              <p:par>
+                                <p:cTn id="35" presetID="1" presetClass="entr" presetSubtype="0" fill="hold" grpId="0" nodeType="clickEffect">
+                                  <p:stCondLst>
+                                    <p:cond delay="0"/>
+                                  </p:stCondLst>
+                                  <p:childTnLst>
+                                    <p:set>
+                                      <p:cBhvr>
+                                        <p:cTn id="36" dur="1" fill="hold">
+                                          <p:stCondLst>
+                                            <p:cond delay="0"/>
+                                          </p:stCondLst>
+                                        </p:cTn>
+                                        <p:tgtEl>
+                                          <p:spTgt spid="3"/>
+                                        </p:tgtEl>
+                                        <p:attrNameLst>
+                                          <p:attrName>style.visibility</p:attrName>
+                                        </p:attrNameLst>
+                                      </p:cBhvr>
+                                      <p:to>
+                                        <p:strVal val="visible"/>
+                                      </p:to>
+                                    </p:set>
+                                  </p:childTnLst>
+                                </p:cTn>
+                              </p:par>
+                            </p:childTnLst>
+                          </p:cTn>
+                        </p:par>
+                      </p:childTnLst>
+                    </p:cTn>
+                  </p:par>
+                  <p:par>
+                    <p:cTn id="37" fill="hold">
+                      <p:stCondLst>
+                        <p:cond delay="indefinite"/>
+                      </p:stCondLst>
+                      <p:childTnLst>
+                        <p:par>
+                          <p:cTn id="38" fill="hold">
+                            <p:stCondLst>
+                              <p:cond delay="0"/>
+                            </p:stCondLst>
+                            <p:childTnLst>
+                              <p:par>
+                                <p:cTn id="39" presetID="1" presetClass="entr" presetSubtype="0" fill="hold" grpId="0" nodeType="clickEffect">
+                                  <p:stCondLst>
+                                    <p:cond delay="0"/>
+                                  </p:stCondLst>
+                                  <p:childTnLst>
+                                    <p:set>
+                                      <p:cBhvr>
+                                        <p:cTn id="40" dur="1" fill="hold">
+                                          <p:stCondLst>
+                                            <p:cond delay="0"/>
+                                          </p:stCondLst>
+                                        </p:cTn>
+                                        <p:tgtEl>
+                                          <p:spTgt spid="4"/>
+                                        </p:tgtEl>
+                                        <p:attrNameLst>
+                                          <p:attrName>style.visibility</p:attrName>
+                                        </p:attrNameLst>
+                                      </p:cBhvr>
+                                      <p:to>
+                                        <p:strVal val="visible"/>
+                                      </p:to>
+                                    </p:set>
+                                  </p:childTnLst>
+                                </p:cTn>
+                              </p:par>
+                            </p:childTnLst>
+                          </p:cTn>
+                        </p:par>
+                      </p:childTnLst>
+                    </p:cTn>
+                  </p:par>
                 </p:childTnLst>
               </p:cTn>
               <p:prevCondLst>
@@ -6196,6 +6933,9 @@
       <p:bldP spid="49" grpId="0"/>
       <p:bldP spid="50" grpId="0"/>
       <p:bldP spid="53" grpId="0"/>
+      <p:bldP spid="2" grpId="0"/>
+      <p:bldP spid="3" grpId="0"/>
+      <p:bldP spid="4" grpId="0"/>
     </p:bldLst>
   </p:timing>
 </p:sld>

</xml_diff>